<commit_message>
delete trees.pptx, edit trees-def.pptx
</commit_message>
<xml_diff>
--- a/spring12/slidesS12/trees-def.pptx
+++ b/spring12/slidesS12/trees-def.pptx
@@ -29,7 +29,7 @@
     <p:sldId id="778" r:id="rId17"/>
   </p:sldIdLst>
   <p:sldSz cx="9144000" cy="6858000" type="screen4x3"/>
-  <p:notesSz cx="7315200" cy="9601200"/>
+  <p:notesSz cx="9601200" cy="7315200"/>
   <p:custDataLst>
     <p:tags r:id="rId21"/>
   </p:custDataLst>
@@ -198,8 +198,8 @@
         </p:nvSpPr>
         <p:spPr bwMode="auto">
           <a:xfrm>
-            <a:off x="1" y="0"/>
-            <a:ext cx="3170238" cy="479425"/>
+            <a:off x="2" y="0"/>
+            <a:ext cx="4160937" cy="365276"/>
           </a:xfrm>
           <a:prstGeom prst="rect">
             <a:avLst/>
@@ -246,8 +246,8 @@
         </p:nvSpPr>
         <p:spPr bwMode="auto">
           <a:xfrm>
-            <a:off x="4143376" y="0"/>
-            <a:ext cx="3170238" cy="479425"/>
+            <a:off x="5438181" y="0"/>
+            <a:ext cx="4160937" cy="365276"/>
           </a:xfrm>
           <a:prstGeom prst="rect">
             <a:avLst/>
@@ -294,8 +294,8 @@
         </p:nvSpPr>
         <p:spPr bwMode="auto">
           <a:xfrm>
-            <a:off x="1" y="9120189"/>
-            <a:ext cx="3170238" cy="479425"/>
+            <a:off x="2" y="6948716"/>
+            <a:ext cx="4160937" cy="365276"/>
           </a:xfrm>
           <a:prstGeom prst="rect">
             <a:avLst/>
@@ -342,8 +342,8 @@
         </p:nvSpPr>
         <p:spPr bwMode="auto">
           <a:xfrm>
-            <a:off x="4143376" y="9120189"/>
-            <a:ext cx="3170238" cy="479425"/>
+            <a:off x="5438181" y="6948716"/>
+            <a:ext cx="4160937" cy="365276"/>
           </a:xfrm>
           <a:prstGeom prst="rect">
             <a:avLst/>
@@ -433,8 +433,8 @@
         </p:nvSpPr>
         <p:spPr bwMode="auto">
           <a:xfrm>
-            <a:off x="1" y="0"/>
-            <a:ext cx="3170238" cy="479425"/>
+            <a:off x="2" y="0"/>
+            <a:ext cx="4160937" cy="365276"/>
           </a:xfrm>
           <a:prstGeom prst="rect">
             <a:avLst/>
@@ -481,8 +481,8 @@
         </p:nvSpPr>
         <p:spPr bwMode="auto">
           <a:xfrm>
-            <a:off x="4144964" y="0"/>
-            <a:ext cx="3170237" cy="479425"/>
+            <a:off x="5440266" y="0"/>
+            <a:ext cx="4160936" cy="365276"/>
           </a:xfrm>
           <a:prstGeom prst="rect">
             <a:avLst/>
@@ -529,8 +529,8 @@
         </p:nvSpPr>
         <p:spPr bwMode="auto">
           <a:xfrm>
-            <a:off x="1257300" y="720725"/>
-            <a:ext cx="4800600" cy="3600450"/>
+            <a:off x="2971800" y="549275"/>
+            <a:ext cx="3657600" cy="2743200"/>
           </a:xfrm>
           <a:prstGeom prst="rect">
             <a:avLst/>
@@ -558,8 +558,8 @@
         </p:nvSpPr>
         <p:spPr bwMode="auto">
           <a:xfrm>
-            <a:off x="976314" y="4560889"/>
-            <a:ext cx="5362575" cy="4319587"/>
+            <a:off x="1281413" y="3474963"/>
+            <a:ext cx="7038380" cy="3291114"/>
           </a:xfrm>
           <a:prstGeom prst="rect">
             <a:avLst/>
@@ -629,8 +629,8 @@
         </p:nvSpPr>
         <p:spPr bwMode="auto">
           <a:xfrm>
-            <a:off x="1" y="9121776"/>
-            <a:ext cx="3170238" cy="479425"/>
+            <a:off x="2" y="6949925"/>
+            <a:ext cx="4160937" cy="365276"/>
           </a:xfrm>
           <a:prstGeom prst="rect">
             <a:avLst/>
@@ -677,8 +677,8 @@
         </p:nvSpPr>
         <p:spPr bwMode="auto">
           <a:xfrm>
-            <a:off x="4144964" y="9121776"/>
-            <a:ext cx="3170237" cy="479425"/>
+            <a:off x="5440266" y="6949925"/>
+            <a:ext cx="4160936" cy="365276"/>
           </a:xfrm>
           <a:prstGeom prst="rect">
             <a:avLst/>
@@ -984,8 +984,8 @@
         </p:nvSpPr>
         <p:spPr>
           <a:xfrm>
-            <a:off x="1260475" y="720725"/>
-            <a:ext cx="4799013" cy="3600450"/>
+            <a:off x="2974975" y="549275"/>
+            <a:ext cx="3657600" cy="2743200"/>
           </a:xfrm>
           <a:ln/>
         </p:spPr>
@@ -1082,8 +1082,8 @@
         </p:nvSpPr>
         <p:spPr>
           <a:xfrm>
-            <a:off x="1260475" y="720725"/>
-            <a:ext cx="4799013" cy="3600450"/>
+            <a:off x="2974975" y="549275"/>
+            <a:ext cx="3657600" cy="2743200"/>
           </a:xfrm>
           <a:ln/>
         </p:spPr>
@@ -1180,8 +1180,8 @@
         </p:nvSpPr>
         <p:spPr>
           <a:xfrm>
-            <a:off x="1260475" y="720725"/>
-            <a:ext cx="4799013" cy="3600450"/>
+            <a:off x="2974975" y="549275"/>
+            <a:ext cx="3657600" cy="2743200"/>
           </a:xfrm>
           <a:ln/>
         </p:spPr>
@@ -1278,8 +1278,8 @@
         </p:nvSpPr>
         <p:spPr>
           <a:xfrm>
-            <a:off x="1260475" y="720725"/>
-            <a:ext cx="4799013" cy="3600450"/>
+            <a:off x="2974975" y="549275"/>
+            <a:ext cx="3657600" cy="2743200"/>
           </a:xfrm>
           <a:ln/>
         </p:spPr>
@@ -1376,8 +1376,8 @@
         </p:nvSpPr>
         <p:spPr>
           <a:xfrm>
-            <a:off x="1260475" y="720725"/>
-            <a:ext cx="4799013" cy="3600450"/>
+            <a:off x="2974975" y="549275"/>
+            <a:ext cx="3657600" cy="2743200"/>
           </a:xfrm>
           <a:ln/>
         </p:spPr>
@@ -1474,8 +1474,8 @@
         </p:nvSpPr>
         <p:spPr>
           <a:xfrm>
-            <a:off x="1260475" y="720725"/>
-            <a:ext cx="4799013" cy="3600450"/>
+            <a:off x="2974975" y="549275"/>
+            <a:ext cx="3657600" cy="2743200"/>
           </a:xfrm>
           <a:ln/>
         </p:spPr>
@@ -1572,8 +1572,8 @@
         </p:nvSpPr>
         <p:spPr>
           <a:xfrm>
-            <a:off x="1260475" y="720725"/>
-            <a:ext cx="4799013" cy="3600450"/>
+            <a:off x="2974975" y="549275"/>
+            <a:ext cx="3657600" cy="2743200"/>
           </a:xfrm>
           <a:ln/>
         </p:spPr>
@@ -1670,8 +1670,8 @@
         </p:nvSpPr>
         <p:spPr>
           <a:xfrm>
-            <a:off x="1260475" y="720725"/>
-            <a:ext cx="4799013" cy="3600450"/>
+            <a:off x="2974975" y="549275"/>
+            <a:ext cx="3657600" cy="2743200"/>
           </a:xfrm>
           <a:ln/>
         </p:spPr>
@@ -1768,8 +1768,8 @@
         </p:nvSpPr>
         <p:spPr>
           <a:xfrm>
-            <a:off x="1260475" y="720725"/>
-            <a:ext cx="4799013" cy="3600450"/>
+            <a:off x="2974975" y="549275"/>
+            <a:ext cx="3657600" cy="2743200"/>
           </a:xfrm>
           <a:ln/>
         </p:spPr>
@@ -1866,8 +1866,8 @@
         </p:nvSpPr>
         <p:spPr>
           <a:xfrm>
-            <a:off x="1260475" y="720725"/>
-            <a:ext cx="4799013" cy="3600450"/>
+            <a:off x="2974975" y="549275"/>
+            <a:ext cx="3657600" cy="2743200"/>
           </a:xfrm>
           <a:ln/>
         </p:spPr>
@@ -1964,8 +1964,8 @@
         </p:nvSpPr>
         <p:spPr>
           <a:xfrm>
-            <a:off x="1260475" y="720725"/>
-            <a:ext cx="4799013" cy="3600450"/>
+            <a:off x="2974975" y="549275"/>
+            <a:ext cx="3657600" cy="2743200"/>
           </a:xfrm>
           <a:ln/>
         </p:spPr>
@@ -2062,8 +2062,8 @@
         </p:nvSpPr>
         <p:spPr>
           <a:xfrm>
-            <a:off x="1260475" y="720725"/>
-            <a:ext cx="4799013" cy="3600450"/>
+            <a:off x="2974975" y="549275"/>
+            <a:ext cx="3657600" cy="2743200"/>
           </a:xfrm>
           <a:ln/>
         </p:spPr>
@@ -2160,8 +2160,8 @@
         </p:nvSpPr>
         <p:spPr>
           <a:xfrm>
-            <a:off x="1260475" y="720725"/>
-            <a:ext cx="4799013" cy="3600450"/>
+            <a:off x="2974975" y="549275"/>
+            <a:ext cx="3657600" cy="2743200"/>
           </a:xfrm>
           <a:ln/>
         </p:spPr>
@@ -2258,8 +2258,8 @@
         </p:nvSpPr>
         <p:spPr>
           <a:xfrm>
-            <a:off x="1260475" y="720725"/>
-            <a:ext cx="4799013" cy="3600450"/>
+            <a:off x="2974975" y="549275"/>
+            <a:ext cx="3657600" cy="2743200"/>
           </a:xfrm>
           <a:ln/>
         </p:spPr>
@@ -4110,9 +4110,14 @@
   <p:clrMapOvr>
     <a:masterClrMapping/>
   </p:clrMapOvr>
-  <p:transition xmlns:p14="http://schemas.microsoft.com/office/powerpoint/2010/main" spd="slow">
-    <p:fade thruBlk="1"/>
-  </p:transition>
+  <mc:AlternateContent xmlns:mc="http://schemas.openxmlformats.org/markup-compatibility/2006">
+    <mc:Choice xmlns:p14="http://schemas.microsoft.com/office/powerpoint/2010/main" Requires="p14">
+      <p:transition p14:dur="0"/>
+    </mc:Choice>
+    <mc:Fallback>
+      <p:transition xmlns:p14="http://schemas.microsoft.com/office/powerpoint/2010/main"/>
+    </mc:Fallback>
+  </mc:AlternateContent>
   <p:timing>
     <p:tnLst>
       <p:par>
@@ -4808,30 +4813,36 @@
           <a:lstStyle/>
           <a:p>
             <a:r>
-              <a:rPr lang="en-US" sz="6600">
+              <a:rPr lang="en-US" sz="6600" dirty="0">
                 <a:latin typeface="Comic Sans MS" pitchFamily="8" charset="0"/>
               </a:rPr>
               <a:t>deleting </a:t>
             </a:r>
             <a:r>
-              <a:rPr lang="en-US" sz="6600">
+              <a:rPr lang="en-US" sz="6600" dirty="0" smtClean="0">
                 <a:solidFill>
                   <a:srgbClr val="008000"/>
                 </a:solidFill>
                 <a:latin typeface="Comic Sans MS" pitchFamily="8" charset="0"/>
               </a:rPr>
-              <a:t>B</a:t>
-            </a:r>
-            <a:r>
-              <a:rPr lang="en-US" sz="6600">
+              <a:t>e</a:t>
+            </a:r>
+            <a:r>
+              <a:rPr lang="en-US" sz="6600" dirty="0" smtClean="0">
                 <a:latin typeface="Comic Sans MS" pitchFamily="8" charset="0"/>
               </a:rPr>
-              <a:t> gives</a:t>
-            </a:r>
-          </a:p>
-          <a:p>
-            <a:r>
-              <a:rPr lang="en-US" sz="6600">
+              <a:t> </a:t>
+            </a:r>
+            <a:r>
+              <a:rPr lang="en-US" sz="6600" dirty="0">
+                <a:latin typeface="Comic Sans MS" pitchFamily="8" charset="0"/>
+              </a:rPr>
+              <a:t>gives</a:t>
+            </a:r>
+          </a:p>
+          <a:p>
+            <a:r>
+              <a:rPr lang="en-US" sz="6600" dirty="0">
                 <a:latin typeface="Comic Sans MS" pitchFamily="8" charset="0"/>
               </a:rPr>
               <a:t>two components</a:t>
@@ -5593,7 +5604,7 @@
         <p:spPr bwMode="auto">
           <a:xfrm>
             <a:off x="517525" y="4148138"/>
-            <a:ext cx="8178800" cy="1189037"/>
+            <a:ext cx="8051904" cy="1200329"/>
           </a:xfrm>
           <a:prstGeom prst="rect">
             <a:avLst/>
@@ -5613,16 +5624,16 @@
           <a:lstStyle/>
           <a:p>
             <a:r>
-              <a:rPr lang="en-US" sz="7200">
+              <a:rPr lang="en-US" sz="7200" dirty="0" smtClean="0">
                 <a:solidFill>
                   <a:schemeClr val="accent2"/>
                 </a:solidFill>
                 <a:latin typeface="Comic Sans MS" pitchFamily="8" charset="0"/>
               </a:rPr>
-              <a:t>A</a:t>
-            </a:r>
-            <a:r>
-              <a:rPr lang="en-US" sz="7200" i="1">
+              <a:t>f</a:t>
+            </a:r>
+            <a:r>
+              <a:rPr lang="en-US" sz="7200" dirty="0" smtClean="0">
                 <a:solidFill>
                   <a:srgbClr val="008000"/>
                 </a:solidFill>
@@ -5631,13 +5642,13 @@
               <a:t> </a:t>
             </a:r>
             <a:r>
-              <a:rPr lang="en-US" sz="7200">
+              <a:rPr lang="en-US" sz="7200" dirty="0">
                 <a:latin typeface="Comic Sans MS" pitchFamily="8" charset="0"/>
               </a:rPr>
               <a:t>is</a:t>
             </a:r>
             <a:r>
-              <a:rPr lang="en-US" sz="7200" i="1">
+              <a:rPr lang="en-US" sz="7200" i="1" dirty="0">
                 <a:solidFill>
                   <a:srgbClr val="008000"/>
                 </a:solidFill>
@@ -5646,13 +5657,16 @@
               <a:t> </a:t>
             </a:r>
             <a:r>
-              <a:rPr lang="en-US" sz="7200" i="1">
+              <a:rPr lang="en-US" sz="7200" dirty="0">
+                <a:solidFill>
+                  <a:srgbClr val="930093"/>
+                </a:solidFill>
                 <a:latin typeface="Comic Sans MS" pitchFamily="8" charset="0"/>
               </a:rPr>
               <a:t>not</a:t>
             </a:r>
             <a:r>
-              <a:rPr lang="en-US" sz="7200">
+              <a:rPr lang="en-US" sz="7200" dirty="0">
                 <a:latin typeface="Comic Sans MS" pitchFamily="8" charset="0"/>
               </a:rPr>
               <a:t> a cut edge</a:t>
@@ -5671,7 +5685,7 @@
         <p:spPr bwMode="auto">
           <a:xfrm>
             <a:off x="4460875" y="1587500"/>
-            <a:ext cx="555625" cy="701675"/>
+            <a:ext cx="447158" cy="707886"/>
           </a:xfrm>
           <a:prstGeom prst="rect">
             <a:avLst/>
@@ -5691,14 +5705,20 @@
           <a:lstStyle/>
           <a:p>
             <a:r>
-              <a:rPr lang="en-US">
+              <a:rPr lang="en-US" dirty="0" smtClean="0">
                 <a:solidFill>
                   <a:schemeClr val="accent2"/>
                 </a:solidFill>
                 <a:latin typeface="Comic Sans MS" pitchFamily="8" charset="0"/>
               </a:rPr>
-              <a:t>A</a:t>
-            </a:r>
+              <a:t>f</a:t>
+            </a:r>
+            <a:endParaRPr lang="en-US" dirty="0">
+              <a:solidFill>
+                <a:schemeClr val="accent2"/>
+              </a:solidFill>
+              <a:latin typeface="Comic Sans MS" pitchFamily="8" charset="0"/>
+            </a:endParaRPr>
           </a:p>
         </p:txBody>
       </p:sp>
@@ -6476,13 +6496,19 @@
                 </a:solidFill>
                 <a:latin typeface="Comic Sans MS" pitchFamily="8" charset="0"/>
               </a:rPr>
-              <a:t>A</a:t>
+              <a:t>f</a:t>
             </a:r>
             <a:r>
               <a:rPr lang="en-US" sz="6000" dirty="0" smtClean="0">
                 <a:latin typeface="Comic Sans MS" pitchFamily="8" charset="0"/>
               </a:rPr>
-              <a:t> deleted</a:t>
+              <a:t> </a:t>
+            </a:r>
+            <a:r>
+              <a:rPr lang="en-US" sz="6000" dirty="0" smtClean="0">
+                <a:latin typeface="Comic Sans MS" pitchFamily="8" charset="0"/>
+              </a:rPr>
+              <a:t>deleted</a:t>
             </a:r>
             <a:endParaRPr lang="en-US" sz="6000" dirty="0">
               <a:latin typeface="Comic Sans MS" pitchFamily="8" charset="0"/>
@@ -8014,7 +8040,7 @@
                             </p:stCondLst>
                             <p:childTnLst>
                               <p:par>
-                                <p:cTn id="5" presetID="1" presetClass="entr" presetSubtype="0" fill="hold" nodeType="clickEffect">
+                                <p:cTn id="5" presetID="9" presetClass="entr" presetSubtype="0" fill="hold" nodeType="clickEffect">
                                   <p:stCondLst>
                                     <p:cond delay="0"/>
                                   </p:stCondLst>
@@ -8041,18 +8067,30 @@
                                         <p:strVal val="visible"/>
                                       </p:to>
                                     </p:set>
+                                    <p:animEffect transition="in" filter="dissolve">
+                                      <p:cBhvr>
+                                        <p:cTn id="7" dur="500"/>
+                                        <p:tgtEl>
+                                          <p:spTgt spid="744451">
+                                            <p:txEl>
+                                              <p:pRg st="1" end="1"/>
+                                            </p:txEl>
+                                          </p:spTgt>
+                                        </p:tgtEl>
+                                      </p:cBhvr>
+                                    </p:animEffect>
                                   </p:childTnLst>
                                 </p:cTn>
                               </p:par>
                               <p:par>
-                                <p:cTn id="7" presetID="1" presetClass="entr" presetSubtype="0" fill="hold" nodeType="withEffect">
+                                <p:cTn id="8" presetID="9" presetClass="entr" presetSubtype="0" fill="hold" nodeType="withEffect">
                                   <p:stCondLst>
                                     <p:cond delay="0"/>
                                   </p:stCondLst>
                                   <p:childTnLst>
                                     <p:set>
                                       <p:cBhvr>
-                                        <p:cTn id="8" dur="1" fill="hold">
+                                        <p:cTn id="9" dur="1" fill="hold">
                                           <p:stCondLst>
                                             <p:cond delay="0"/>
                                           </p:stCondLst>
@@ -8072,6 +8110,18 @@
                                         <p:strVal val="visible"/>
                                       </p:to>
                                     </p:set>
+                                    <p:animEffect transition="in" filter="dissolve">
+                                      <p:cBhvr>
+                                        <p:cTn id="10" dur="500"/>
+                                        <p:tgtEl>
+                                          <p:spTgt spid="744451">
+                                            <p:txEl>
+                                              <p:pRg st="2" end="2"/>
+                                            </p:txEl>
+                                          </p:spTgt>
+                                        </p:tgtEl>
+                                      </p:cBhvr>
+                                    </p:animEffect>
                                   </p:childTnLst>
                                 </p:cTn>
                               </p:par>
@@ -8082,26 +8132,26 @@
                     </p:cTn>
                   </p:par>
                   <p:par>
-                    <p:cTn id="9" fill="hold">
+                    <p:cTn id="11" fill="hold">
                       <p:stCondLst>
                         <p:cond delay="indefinite"/>
                       </p:stCondLst>
                       <p:childTnLst>
                         <p:par>
-                          <p:cTn id="10" fill="hold">
+                          <p:cTn id="12" fill="hold">
                             <p:stCondLst>
                               <p:cond delay="0"/>
                             </p:stCondLst>
                             <p:childTnLst>
                               <p:par>
-                                <p:cTn id="11" presetID="1" presetClass="entr" presetSubtype="0" fill="hold" nodeType="clickEffect">
+                                <p:cTn id="13" presetID="1" presetClass="entr" presetSubtype="0" fill="hold" nodeType="clickEffect">
                                   <p:stCondLst>
                                     <p:cond delay="0"/>
                                   </p:stCondLst>
                                   <p:childTnLst>
                                     <p:set>
                                       <p:cBhvr>
-                                        <p:cTn id="12" dur="1" fill="hold">
+                                        <p:cTn id="14" dur="1" fill="hold">
                                           <p:stCondLst>
                                             <p:cond delay="0"/>
                                           </p:stCondLst>
@@ -12072,7 +12122,7 @@
                             </p:stCondLst>
                             <p:childTnLst>
                               <p:par>
-                                <p:cTn id="5" presetID="1" presetClass="entr" presetSubtype="0" fill="hold" nodeType="clickEffect">
+                                <p:cTn id="5" presetID="22" presetClass="entr" presetSubtype="1" fill="hold" nodeType="clickEffect">
                                   <p:stCondLst>
                                     <p:cond delay="0"/>
                                   </p:stCondLst>
@@ -12095,6 +12145,14 @@
                                         <p:strVal val="visible"/>
                                       </p:to>
                                     </p:set>
+                                    <p:animEffect transition="in" filter="wipe(up)">
+                                      <p:cBhvr>
+                                        <p:cTn id="7" dur="500"/>
+                                        <p:tgtEl>
+                                          <p:spTgt spid="2"/>
+                                        </p:tgtEl>
+                                      </p:cBhvr>
+                                    </p:animEffect>
                                   </p:childTnLst>
                                 </p:cTn>
                               </p:par>
@@ -12181,8 +12239,8 @@
         </p:nvGrpSpPr>
         <p:grpSpPr bwMode="auto">
           <a:xfrm>
-            <a:off x="982663" y="2286000"/>
-            <a:ext cx="6408737" cy="2654300"/>
+            <a:off x="1105292" y="1879580"/>
+            <a:ext cx="6920716" cy="3051216"/>
             <a:chOff x="488" y="2358"/>
             <a:chExt cx="4037" cy="1672"/>
           </a:xfrm>
@@ -13384,18 +13442,9 @@
   <p:clrMapOvr>
     <a:masterClrMapping/>
   </p:clrMapOvr>
-  <mc:AlternateContent xmlns:mc="http://schemas.openxmlformats.org/markup-compatibility/2006" xmlns:p14="http://schemas.microsoft.com/office/powerpoint/2010/main">
-    <mc:Choice Requires="p14">
-      <p:transition spd="med" p14:dur="700">
-        <p:fade/>
-      </p:transition>
-    </mc:Choice>
-    <mc:Fallback xmlns="">
-      <p:transition xmlns:p14="http://schemas.microsoft.com/office/powerpoint/2010/main" spd="med">
-        <p:fade/>
-      </p:transition>
-    </mc:Fallback>
-  </mc:AlternateContent>
+  <p:transition xmlns:p14="http://schemas.microsoft.com/office/powerpoint/2010/main" spd="slow">
+    <p:fade/>
+  </p:transition>
   <p:timing>
     <p:tnLst>
       <p:par>
@@ -15019,8 +15068,8 @@
         </p:nvSpPr>
         <p:spPr bwMode="auto">
           <a:xfrm>
-            <a:off x="5711825" y="2214563"/>
-            <a:ext cx="473075" cy="641350"/>
+            <a:off x="5711825" y="2143515"/>
+            <a:ext cx="442774" cy="646331"/>
           </a:xfrm>
           <a:prstGeom prst="rect">
             <a:avLst/>
@@ -15040,14 +15089,20 @@
           <a:lstStyle/>
           <a:p>
             <a:r>
-              <a:rPr lang="en-US" sz="3600" b="1">
+              <a:rPr lang="en-US" sz="3600" b="1" dirty="0" smtClean="0">
                 <a:solidFill>
                   <a:srgbClr val="008000"/>
                 </a:solidFill>
                 <a:latin typeface="Comic Sans MS" pitchFamily="8" charset="0"/>
               </a:rPr>
-              <a:t>B</a:t>
-            </a:r>
+              <a:t>e</a:t>
+            </a:r>
+            <a:endParaRPr lang="en-US" sz="3600" b="1" dirty="0">
+              <a:solidFill>
+                <a:srgbClr val="008000"/>
+              </a:solidFill>
+              <a:latin typeface="Comic Sans MS" pitchFamily="8" charset="0"/>
+            </a:endParaRPr>
           </a:p>
         </p:txBody>
       </p:sp>
@@ -15111,19 +15166,25 @@
           <a:lstStyle/>
           <a:p>
             <a:r>
-              <a:rPr lang="en-US" sz="7200">
+              <a:rPr lang="en-US" sz="7200" dirty="0" smtClean="0">
                 <a:solidFill>
                   <a:srgbClr val="008000"/>
                 </a:solidFill>
                 <a:latin typeface="Comic Sans MS" pitchFamily="8" charset="0"/>
               </a:rPr>
-              <a:t>B</a:t>
-            </a:r>
-            <a:r>
-              <a:rPr lang="en-US" sz="7200">
+              <a:t>e</a:t>
+            </a:r>
+            <a:r>
+              <a:rPr lang="en-US" sz="7200" dirty="0" smtClean="0">
                 <a:latin typeface="Comic Sans MS" pitchFamily="8" charset="0"/>
               </a:rPr>
-              <a:t> is a cut edge</a:t>
+              <a:t> </a:t>
+            </a:r>
+            <a:r>
+              <a:rPr lang="en-US" sz="7200" dirty="0">
+                <a:latin typeface="Comic Sans MS" pitchFamily="8" charset="0"/>
+              </a:rPr>
+              <a:t>is a cut edge</a:t>
             </a:r>
           </a:p>
         </p:txBody>

</xml_diff>